<commit_message>
Added datadrivna test in last slide
</commit_message>
<xml_diff>
--- a/Selenium_VS2015_Bas.pptx
+++ b/Selenium_VS2015_Bas.pptx
@@ -233,7 +233,7 @@
             <a:fld id="{4B692815-F29B-470E-933C-C013C16C0B4A}" type="datetimeFigureOut">
               <a:rPr lang="sv-SE" smtClean="0"/>
               <a:pPr/>
-              <a:t>2017-01-08</a:t>
+              <a:t>2017-01-09</a:t>
             </a:fld>
             <a:endParaRPr lang="sv-SE"/>
           </a:p>
@@ -10902,6 +10902,10 @@
             <a:pPr>
               <a:buNone/>
             </a:pPr>
+            <a:r>
+              <a:rPr lang="sv" dirty="0"/>
+              <a:t/>
+            </a:r>
             <a:br>
               <a:rPr lang="sv" dirty="0"/>
             </a:br>
@@ -11991,6 +11995,10 @@
             <a:pPr>
               <a:buNone/>
             </a:pPr>
+            <a:r>
+              <a:rPr lang="sv" dirty="0"/>
+              <a:t/>
+            </a:r>
             <a:br>
               <a:rPr lang="sv" dirty="0"/>
             </a:br>
@@ -12208,6 +12216,10 @@
             <a:pPr>
               <a:buNone/>
             </a:pPr>
+            <a:r>
+              <a:rPr lang="sv" dirty="0"/>
+              <a:t/>
+            </a:r>
             <a:br>
               <a:rPr lang="sv" dirty="0"/>
             </a:br>
@@ -12292,35 +12304,35 @@
                 <a:gridCol w="1219200">
                   <a:extLst>
                     <a:ext uri="{9D8B030D-6E8A-4147-A177-3AD203B41FA5}">
-                      <a16:colId xmlns:a16="http://schemas.microsoft.com/office/drawing/2014/main" val="4165953490"/>
+                      <a16:colId xmlns:a16="http://schemas.microsoft.com/office/drawing/2014/main" xmlns="" val="4165953490"/>
                     </a:ext>
                   </a:extLst>
                 </a:gridCol>
                 <a:gridCol w="1219200">
                   <a:extLst>
                     <a:ext uri="{9D8B030D-6E8A-4147-A177-3AD203B41FA5}">
-                      <a16:colId xmlns:a16="http://schemas.microsoft.com/office/drawing/2014/main" val="3584276981"/>
+                      <a16:colId xmlns:a16="http://schemas.microsoft.com/office/drawing/2014/main" xmlns="" val="3584276981"/>
                     </a:ext>
                   </a:extLst>
                 </a:gridCol>
                 <a:gridCol w="1219200">
                   <a:extLst>
                     <a:ext uri="{9D8B030D-6E8A-4147-A177-3AD203B41FA5}">
-                      <a16:colId xmlns:a16="http://schemas.microsoft.com/office/drawing/2014/main" val="2576788713"/>
+                      <a16:colId xmlns:a16="http://schemas.microsoft.com/office/drawing/2014/main" xmlns="" val="2576788713"/>
                     </a:ext>
                   </a:extLst>
                 </a:gridCol>
                 <a:gridCol w="1219200">
                   <a:extLst>
                     <a:ext uri="{9D8B030D-6E8A-4147-A177-3AD203B41FA5}">
-                      <a16:colId xmlns:a16="http://schemas.microsoft.com/office/drawing/2014/main" val="2230127545"/>
+                      <a16:colId xmlns:a16="http://schemas.microsoft.com/office/drawing/2014/main" xmlns="" val="2230127545"/>
                     </a:ext>
                   </a:extLst>
                 </a:gridCol>
                 <a:gridCol w="1219200">
                   <a:extLst>
                     <a:ext uri="{9D8B030D-6E8A-4147-A177-3AD203B41FA5}">
-                      <a16:colId xmlns:a16="http://schemas.microsoft.com/office/drawing/2014/main" val="3286263590"/>
+                      <a16:colId xmlns:a16="http://schemas.microsoft.com/office/drawing/2014/main" xmlns="" val="3286263590"/>
                     </a:ext>
                   </a:extLst>
                 </a:gridCol>
@@ -12392,7 +12404,7 @@
                 </a:tc>
                 <a:extLst>
                   <a:ext uri="{0D108BD9-81ED-4DB2-BD59-A6C34878D82A}">
-                    <a16:rowId xmlns:a16="http://schemas.microsoft.com/office/drawing/2014/main" val="1235414100"/>
+                    <a16:rowId xmlns:a16="http://schemas.microsoft.com/office/drawing/2014/main" xmlns="" val="1235414100"/>
                   </a:ext>
                 </a:extLst>
               </a:tr>
@@ -12461,7 +12473,7 @@
                 </a:tc>
                 <a:extLst>
                   <a:ext uri="{0D108BD9-81ED-4DB2-BD59-A6C34878D82A}">
-                    <a16:rowId xmlns:a16="http://schemas.microsoft.com/office/drawing/2014/main" val="3986363076"/>
+                    <a16:rowId xmlns:a16="http://schemas.microsoft.com/office/drawing/2014/main" xmlns="" val="3986363076"/>
                   </a:ext>
                 </a:extLst>
               </a:tr>
@@ -12533,7 +12545,7 @@
                 </a:tc>
                 <a:extLst>
                   <a:ext uri="{0D108BD9-81ED-4DB2-BD59-A6C34878D82A}">
-                    <a16:rowId xmlns:a16="http://schemas.microsoft.com/office/drawing/2014/main" val="781537455"/>
+                    <a16:rowId xmlns:a16="http://schemas.microsoft.com/office/drawing/2014/main" xmlns="" val="781537455"/>
                   </a:ext>
                 </a:extLst>
               </a:tr>
@@ -12605,7 +12617,7 @@
                 </a:tc>
                 <a:extLst>
                   <a:ext uri="{0D108BD9-81ED-4DB2-BD59-A6C34878D82A}">
-                    <a16:rowId xmlns:a16="http://schemas.microsoft.com/office/drawing/2014/main" val="1034528203"/>
+                    <a16:rowId xmlns:a16="http://schemas.microsoft.com/office/drawing/2014/main" xmlns="" val="1034528203"/>
                   </a:ext>
                 </a:extLst>
               </a:tr>
@@ -12674,7 +12686,7 @@
                 </a:tc>
                 <a:extLst>
                   <a:ext uri="{0D108BD9-81ED-4DB2-BD59-A6C34878D82A}">
-                    <a16:rowId xmlns:a16="http://schemas.microsoft.com/office/drawing/2014/main" val="1905536096"/>
+                    <a16:rowId xmlns:a16="http://schemas.microsoft.com/office/drawing/2014/main" xmlns="" val="1905536096"/>
                   </a:ext>
                 </a:extLst>
               </a:tr>
@@ -12740,7 +12752,7 @@
                 </a:tc>
                 <a:extLst>
                   <a:ext uri="{0D108BD9-81ED-4DB2-BD59-A6C34878D82A}">
-                    <a16:rowId xmlns:a16="http://schemas.microsoft.com/office/drawing/2014/main" val="827014771"/>
+                    <a16:rowId xmlns:a16="http://schemas.microsoft.com/office/drawing/2014/main" xmlns="" val="827014771"/>
                   </a:ext>
                 </a:extLst>
               </a:tr>
@@ -12809,6 +12821,10 @@
             <a:pPr>
               <a:buNone/>
             </a:pPr>
+            <a:r>
+              <a:rPr lang="sv" dirty="0"/>
+              <a:t/>
+            </a:r>
             <a:br>
               <a:rPr lang="sv" dirty="0"/>
             </a:br>
@@ -12991,6 +13007,10 @@
             <a:pPr>
               <a:buNone/>
             </a:pPr>
+            <a:r>
+              <a:rPr lang="sv" dirty="0"/>
+              <a:t/>
+            </a:r>
             <a:br>
               <a:rPr lang="sv" dirty="0"/>
             </a:br>
@@ -13296,6 +13316,10 @@
             <a:pPr>
               <a:buNone/>
             </a:pPr>
+            <a:r>
+              <a:rPr lang="sv" dirty="0"/>
+              <a:t/>
+            </a:r>
             <a:br>
               <a:rPr lang="sv" dirty="0"/>
             </a:br>
@@ -13436,6 +13460,10 @@
             <a:pPr>
               <a:buNone/>
             </a:pPr>
+            <a:r>
+              <a:rPr lang="sv" dirty="0"/>
+              <a:t/>
+            </a:r>
             <a:br>
               <a:rPr lang="sv" dirty="0"/>
             </a:br>
@@ -14585,6 +14613,10 @@
           </a:bodyPr>
           <a:lstStyle/>
           <a:p>
+            <a:r>
+              <a:rPr lang="sv" dirty="0"/>
+              <a:t/>
+            </a:r>
             <a:br>
               <a:rPr lang="sv" dirty="0"/>
             </a:br>
@@ -14733,7 +14765,6 @@
               <a:rPr lang="sv-SE" dirty="0"/>
               <a:t>I webbläsaren välj/klicka i sökfältet</a:t>
             </a:r>
-            <a:endParaRPr lang="sv-SE" dirty="0"/>
           </a:p>
         </p:txBody>
       </p:sp>
@@ -14795,6 +14826,10 @@
           </a:bodyPr>
           <a:lstStyle/>
           <a:p>
+            <a:r>
+              <a:rPr lang="sv" dirty="0"/>
+              <a:t/>
+            </a:r>
             <a:br>
               <a:rPr lang="sv" dirty="0"/>
             </a:br>
@@ -14982,6 +15017,10 @@
             <a:pPr>
               <a:buNone/>
             </a:pPr>
+            <a:r>
+              <a:rPr lang="sv" dirty="0"/>
+              <a:t/>
+            </a:r>
             <a:br>
               <a:rPr lang="sv" dirty="0"/>
             </a:br>
@@ -15181,6 +15220,10 @@
             <a:pPr>
               <a:buNone/>
             </a:pPr>
+            <a:r>
+              <a:rPr lang="sv" dirty="0"/>
+              <a:t/>
+            </a:r>
             <a:br>
               <a:rPr lang="sv" dirty="0"/>
             </a:br>
@@ -15435,6 +15478,10 @@
             <a:pPr>
               <a:buNone/>
             </a:pPr>
+            <a:r>
+              <a:rPr lang="sv" dirty="0"/>
+              <a:t/>
+            </a:r>
             <a:br>
               <a:rPr lang="sv" dirty="0"/>
             </a:br>
@@ -15489,13 +15536,8 @@
             </a:r>
             <a:r>
               <a:rPr lang="sv-SE" sz="2000" dirty="0"/>
-              <a:t>, Nivå 1, 2 </a:t>
-            </a:r>
-            <a:r>
-              <a:rPr lang="sv-SE" sz="2000"/>
-              <a:t>och kanske 3</a:t>
-            </a:r>
-            <a:endParaRPr lang="sv-SE" sz="2000" dirty="0"/>
+              <a:t>, Nivå 1, 2 och kanske 3</a:t>
+            </a:r>
           </a:p>
           <a:p>
             <a:pPr marL="419100">
@@ -15557,8 +15599,35 @@
               <a:t> och </a:t>
             </a:r>
             <a:r>
-              <a:rPr lang="sv-SE" sz="2000" dirty="0" err="1"/>
+              <a:rPr lang="sv-SE" sz="2000" dirty="0" err="1" smtClean="0"/>
               <a:t>plugins</a:t>
+            </a:r>
+            <a:endParaRPr lang="sv-SE" sz="2000" dirty="0" smtClean="0"/>
+          </a:p>
+          <a:p>
+            <a:pPr marL="419100">
+              <a:lnSpc>
+                <a:spcPct val="115000"/>
+              </a:lnSpc>
+              <a:spcBef>
+                <a:spcPts val="0"/>
+              </a:spcBef>
+              <a:buClr>
+                <a:srgbClr val="000000"/>
+              </a:buClr>
+              <a:buSzPct val="166666"/>
+            </a:pPr>
+            <a:r>
+              <a:rPr lang="sv-SE" sz="2000" dirty="0" smtClean="0"/>
+              <a:t>Datadrivna tester (</a:t>
+            </a:r>
+            <a:r>
+              <a:rPr lang="sv-SE" sz="2000" dirty="0" err="1" smtClean="0"/>
+              <a:t>excel</a:t>
+            </a:r>
+            <a:r>
+              <a:rPr lang="sv-SE" sz="2000" smtClean="0"/>
+              <a:t>)</a:t>
             </a:r>
             <a:endParaRPr lang="sv-SE" sz="2000" dirty="0"/>
           </a:p>
@@ -15638,6 +15707,14 @@
   <p:clrMapOvr>
     <a:masterClrMapping/>
   </p:clrMapOvr>
+  <mc:AlternateContent xmlns:mc="http://schemas.openxmlformats.org/markup-compatibility/2006">
+    <mc:Choice xmlns:p14="http://schemas.microsoft.com/office/powerpoint/2010/main" Requires="p14">
+      <p:transition spd="slow" p14:dur="2000"/>
+    </mc:Choice>
+    <mc:Fallback>
+      <p:transition spd="slow"/>
+    </mc:Fallback>
+  </mc:AlternateContent>
 </p:sld>
 </file>
 
@@ -15686,6 +15763,10 @@
             <a:pPr>
               <a:buNone/>
             </a:pPr>
+            <a:r>
+              <a:rPr lang="sv" dirty="0"/>
+              <a:t/>
+            </a:r>
             <a:br>
               <a:rPr lang="sv" dirty="0"/>
             </a:br>
@@ -15995,6 +16076,10 @@
             <a:pPr>
               <a:buNone/>
             </a:pPr>
+            <a:r>
+              <a:rPr lang="sv" dirty="0"/>
+              <a:t/>
+            </a:r>
             <a:br>
               <a:rPr lang="sv" dirty="0"/>
             </a:br>
@@ -16373,6 +16458,10 @@
             <a:pPr>
               <a:buNone/>
             </a:pPr>
+            <a:r>
+              <a:rPr lang="sv" dirty="0"/>
+              <a:t/>
+            </a:r>
             <a:br>
               <a:rPr lang="sv" dirty="0"/>
             </a:br>
@@ -16635,6 +16724,10 @@
             <a:pPr>
               <a:buNone/>
             </a:pPr>
+            <a:r>
+              <a:rPr lang="sv" dirty="0"/>
+              <a:t/>
+            </a:r>
             <a:br>
               <a:rPr lang="sv" dirty="0"/>
             </a:br>
@@ -16969,6 +17062,10 @@
             <a:pPr>
               <a:buNone/>
             </a:pPr>
+            <a:r>
+              <a:rPr lang="sv" dirty="0"/>
+              <a:t/>
+            </a:r>
             <a:br>
               <a:rPr lang="sv" dirty="0"/>
             </a:br>
@@ -17120,6 +17217,10 @@
             <a:pPr>
               <a:buNone/>
             </a:pPr>
+            <a:r>
+              <a:rPr lang="sv" dirty="0"/>
+              <a:t/>
+            </a:r>
             <a:br>
               <a:rPr lang="sv" dirty="0"/>
             </a:br>
@@ -17293,6 +17394,10 @@
             <a:pPr>
               <a:buNone/>
             </a:pPr>
+            <a:r>
+              <a:rPr lang="sv" dirty="0"/>
+              <a:t/>
+            </a:r>
             <a:br>
               <a:rPr lang="sv" dirty="0"/>
             </a:br>

</xml_diff>